<commit_message>
base de datos con docker
</commit_message>
<xml_diff>
--- a/docker.pptx
+++ b/docker.pptx
@@ -10,7 +10,6 @@
     <p:sldId id="258" r:id="rId4"/>
     <p:sldId id="259" r:id="rId5"/>
     <p:sldId id="260" r:id="rId6"/>
-    <p:sldId id="261" r:id="rId7"/>
   </p:sldIdLst>
   <p:sldSz cx="12192000" cy="6858000"/>
   <p:notesSz cx="6858000" cy="9144000"/>
@@ -109,6 +108,11 @@
       </a:defRPr>
     </a:lvl9pPr>
   </p:defaultTextStyle>
+  <p:extLst>
+    <p:ext uri="{EFAFB233-063F-42B5-8137-9DF3F51BA10A}">
+      <p15:sldGuideLst xmlns:p15="http://schemas.microsoft.com/office/powerpoint/2012/main"/>
+    </p:ext>
+  </p:extLst>
 </p:presentation>
 </file>
 
@@ -14277,438 +14281,6 @@
 </p:sld>
 </file>
 
-<file path=ppt/slides/slide6.xml><?xml version="1.0" encoding="utf-8"?>
-<p:sld xmlns:a="http://schemas.openxmlformats.org/drawingml/2006/main" xmlns:r="http://schemas.openxmlformats.org/officeDocument/2006/relationships" xmlns:p="http://schemas.openxmlformats.org/presentationml/2006/main">
-  <p:cSld>
-    <p:spTree>
-      <p:nvGrpSpPr>
-        <p:cNvPr id="1" name=""/>
-        <p:cNvGrpSpPr/>
-        <p:nvPr/>
-      </p:nvGrpSpPr>
-      <p:grpSpPr>
-        <a:xfrm>
-          <a:off x="0" y="0"/>
-          <a:ext cx="0" cy="0"/>
-          <a:chOff x="0" y="0"/>
-          <a:chExt cx="0" cy="0"/>
-        </a:xfrm>
-      </p:grpSpPr>
-      <p:sp>
-        <p:nvSpPr>
-          <p:cNvPr id="2" name="Título 1"/>
-          <p:cNvSpPr>
-            <a:spLocks noGrp="1"/>
-          </p:cNvSpPr>
-          <p:nvPr>
-            <p:ph type="title"/>
-          </p:nvPr>
-        </p:nvSpPr>
-        <p:spPr/>
-        <p:txBody>
-          <a:bodyPr/>
-          <a:lstStyle/>
-          <a:p>
-            <a:r>
-              <a:rPr lang="es-CO" dirty="0" smtClean="0"/>
-              <a:t>QUE ES DOCKER?</a:t>
-            </a:r>
-            <a:endParaRPr lang="es-CO" dirty="0"/>
-          </a:p>
-        </p:txBody>
-      </p:sp>
-      <p:sp>
-        <p:nvSpPr>
-          <p:cNvPr id="3" name="Marcador de contenido 2"/>
-          <p:cNvSpPr>
-            <a:spLocks noGrp="1"/>
-          </p:cNvSpPr>
-          <p:nvPr>
-            <p:ph idx="1"/>
-          </p:nvPr>
-        </p:nvSpPr>
-        <p:spPr/>
-        <p:txBody>
-          <a:bodyPr/>
-          <a:lstStyle/>
-          <a:p>
-            <a:endParaRPr lang="es-CO" dirty="0" smtClean="0"/>
-          </a:p>
-          <a:p>
-            <a:endParaRPr lang="es-CO" dirty="0"/>
-          </a:p>
-          <a:p>
-            <a:endParaRPr lang="es-CO" dirty="0" smtClean="0"/>
-          </a:p>
-          <a:p>
-            <a:endParaRPr lang="es-CO" dirty="0"/>
-          </a:p>
-          <a:p>
-            <a:endParaRPr lang="es-CO" dirty="0"/>
-          </a:p>
-        </p:txBody>
-      </p:sp>
-      <p:pic>
-        <p:nvPicPr>
-          <p:cNvPr id="5" name="Imagen 4"/>
-          <p:cNvPicPr>
-            <a:picLocks noChangeAspect="1"/>
-          </p:cNvPicPr>
-          <p:nvPr/>
-        </p:nvPicPr>
-        <p:blipFill>
-          <a:blip r:embed="rId2"/>
-          <a:stretch>
-            <a:fillRect/>
-          </a:stretch>
-        </p:blipFill>
-        <p:spPr>
-          <a:xfrm>
-            <a:off x="8247882" y="4524207"/>
-            <a:ext cx="3336970" cy="2418461"/>
-          </a:xfrm>
-          <a:prstGeom prst="rect">
-            <a:avLst/>
-          </a:prstGeom>
-        </p:spPr>
-      </p:pic>
-      <p:sp>
-        <p:nvSpPr>
-          <p:cNvPr id="6" name="Marcador de contenido 2"/>
-          <p:cNvSpPr txBox="1">
-            <a:spLocks/>
-          </p:cNvSpPr>
-          <p:nvPr/>
-        </p:nvSpPr>
-        <p:spPr>
-          <a:xfrm>
-            <a:off x="1307354" y="2755900"/>
-            <a:ext cx="8825659" cy="3416300"/>
-          </a:xfrm>
-          <a:prstGeom prst="rect">
-            <a:avLst/>
-          </a:prstGeom>
-        </p:spPr>
-        <p:txBody>
-          <a:bodyPr vert="horz" lIns="91440" tIns="45720" rIns="91440" bIns="45720" rtlCol="0">
-            <a:normAutofit/>
-          </a:bodyPr>
-          <a:lstStyle>
-            <a:lvl1pPr marL="342900" indent="-342900" algn="l" defTabSz="457200" rtl="0" eaLnBrk="1" latinLnBrk="0" hangingPunct="1">
-              <a:spcBef>
-                <a:spcPts val="1000"/>
-              </a:spcBef>
-              <a:spcAft>
-                <a:spcPts val="0"/>
-              </a:spcAft>
-              <a:buClr>
-                <a:schemeClr val="accent1"/>
-              </a:buClr>
-              <a:buSzPct val="80000"/>
-              <a:buFont typeface="Wingdings 3" charset="2"/>
-              <a:buChar char=""/>
-              <a:defRPr sz="1800" b="0" i="0" kern="1200">
-                <a:solidFill>
-                  <a:schemeClr val="tx1">
-                    <a:lumMod val="75000"/>
-                    <a:lumOff val="25000"/>
-                  </a:schemeClr>
-                </a:solidFill>
-                <a:latin typeface="+mn-lt"/>
-                <a:ea typeface="+mn-ea"/>
-                <a:cs typeface="+mn-cs"/>
-              </a:defRPr>
-            </a:lvl1pPr>
-            <a:lvl2pPr marL="742950" indent="-285750" algn="l" defTabSz="457200" rtl="0" eaLnBrk="1" latinLnBrk="0" hangingPunct="1">
-              <a:spcBef>
-                <a:spcPts val="1000"/>
-              </a:spcBef>
-              <a:spcAft>
-                <a:spcPts val="0"/>
-              </a:spcAft>
-              <a:buClr>
-                <a:schemeClr val="accent1"/>
-              </a:buClr>
-              <a:buSzPct val="80000"/>
-              <a:buFont typeface="Wingdings 3" charset="2"/>
-              <a:buChar char=""/>
-              <a:defRPr sz="1600" b="0" i="0" kern="1200">
-                <a:solidFill>
-                  <a:schemeClr val="tx1">
-                    <a:lumMod val="75000"/>
-                    <a:lumOff val="25000"/>
-                  </a:schemeClr>
-                </a:solidFill>
-                <a:latin typeface="+mn-lt"/>
-                <a:ea typeface="+mn-ea"/>
-                <a:cs typeface="+mn-cs"/>
-              </a:defRPr>
-            </a:lvl2pPr>
-            <a:lvl3pPr marL="1143000" indent="-228600" algn="l" defTabSz="457200" rtl="0" eaLnBrk="1" latinLnBrk="0" hangingPunct="1">
-              <a:spcBef>
-                <a:spcPts val="1000"/>
-              </a:spcBef>
-              <a:spcAft>
-                <a:spcPts val="0"/>
-              </a:spcAft>
-              <a:buClr>
-                <a:schemeClr val="accent1"/>
-              </a:buClr>
-              <a:buSzPct val="80000"/>
-              <a:buFont typeface="Wingdings 3" charset="2"/>
-              <a:buChar char=""/>
-              <a:defRPr sz="1400" b="0" i="0" kern="1200">
-                <a:solidFill>
-                  <a:schemeClr val="tx1">
-                    <a:lumMod val="75000"/>
-                    <a:lumOff val="25000"/>
-                  </a:schemeClr>
-                </a:solidFill>
-                <a:latin typeface="+mn-lt"/>
-                <a:ea typeface="+mn-ea"/>
-                <a:cs typeface="+mn-cs"/>
-              </a:defRPr>
-            </a:lvl3pPr>
-            <a:lvl4pPr marL="1600200" indent="-228600" algn="l" defTabSz="457200" rtl="0" eaLnBrk="1" latinLnBrk="0" hangingPunct="1">
-              <a:spcBef>
-                <a:spcPts val="1000"/>
-              </a:spcBef>
-              <a:spcAft>
-                <a:spcPts val="0"/>
-              </a:spcAft>
-              <a:buClr>
-                <a:schemeClr val="accent1"/>
-              </a:buClr>
-              <a:buSzPct val="80000"/>
-              <a:buFont typeface="Wingdings 3" charset="2"/>
-              <a:buChar char=""/>
-              <a:defRPr sz="1200" b="0" i="0" kern="1200">
-                <a:solidFill>
-                  <a:schemeClr val="tx1">
-                    <a:lumMod val="75000"/>
-                    <a:lumOff val="25000"/>
-                  </a:schemeClr>
-                </a:solidFill>
-                <a:latin typeface="+mn-lt"/>
-                <a:ea typeface="+mn-ea"/>
-                <a:cs typeface="+mn-cs"/>
-              </a:defRPr>
-            </a:lvl4pPr>
-            <a:lvl5pPr marL="2057400" indent="-228600" algn="l" defTabSz="457200" rtl="0" eaLnBrk="1" latinLnBrk="0" hangingPunct="1">
-              <a:spcBef>
-                <a:spcPts val="1000"/>
-              </a:spcBef>
-              <a:spcAft>
-                <a:spcPts val="0"/>
-              </a:spcAft>
-              <a:buClr>
-                <a:schemeClr val="accent1"/>
-              </a:buClr>
-              <a:buSzPct val="80000"/>
-              <a:buFont typeface="Wingdings 3" charset="2"/>
-              <a:buChar char=""/>
-              <a:defRPr sz="1200" b="0" i="0" kern="1200">
-                <a:solidFill>
-                  <a:schemeClr val="tx1">
-                    <a:lumMod val="75000"/>
-                    <a:lumOff val="25000"/>
-                  </a:schemeClr>
-                </a:solidFill>
-                <a:latin typeface="+mn-lt"/>
-                <a:ea typeface="+mn-ea"/>
-                <a:cs typeface="+mn-cs"/>
-              </a:defRPr>
-            </a:lvl5pPr>
-            <a:lvl6pPr marL="2514600" indent="-228600" algn="l" defTabSz="457200" rtl="0" eaLnBrk="1" latinLnBrk="0" hangingPunct="1">
-              <a:spcBef>
-                <a:spcPts val="1000"/>
-              </a:spcBef>
-              <a:spcAft>
-                <a:spcPts val="0"/>
-              </a:spcAft>
-              <a:buClr>
-                <a:schemeClr val="accent1"/>
-              </a:buClr>
-              <a:buSzPct val="80000"/>
-              <a:buFont typeface="Wingdings 3" charset="2"/>
-              <a:buChar char=""/>
-              <a:defRPr sz="1200" b="0" i="0" kern="1200">
-                <a:solidFill>
-                  <a:schemeClr val="tx1">
-                    <a:lumMod val="75000"/>
-                    <a:lumOff val="25000"/>
-                  </a:schemeClr>
-                </a:solidFill>
-                <a:latin typeface="+mn-lt"/>
-                <a:ea typeface="+mn-ea"/>
-                <a:cs typeface="+mn-cs"/>
-              </a:defRPr>
-            </a:lvl6pPr>
-            <a:lvl7pPr marL="2971800" indent="-228600" algn="l" defTabSz="457200" rtl="0" eaLnBrk="1" latinLnBrk="0" hangingPunct="1">
-              <a:spcBef>
-                <a:spcPts val="1000"/>
-              </a:spcBef>
-              <a:spcAft>
-                <a:spcPts val="0"/>
-              </a:spcAft>
-              <a:buClr>
-                <a:schemeClr val="accent1"/>
-              </a:buClr>
-              <a:buSzPct val="80000"/>
-              <a:buFont typeface="Wingdings 3" charset="2"/>
-              <a:buChar char=""/>
-              <a:defRPr sz="1200" b="0" i="0" kern="1200">
-                <a:solidFill>
-                  <a:schemeClr val="tx1">
-                    <a:lumMod val="75000"/>
-                    <a:lumOff val="25000"/>
-                  </a:schemeClr>
-                </a:solidFill>
-                <a:latin typeface="+mn-lt"/>
-                <a:ea typeface="+mn-ea"/>
-                <a:cs typeface="+mn-cs"/>
-              </a:defRPr>
-            </a:lvl7pPr>
-            <a:lvl8pPr marL="3429000" indent="-228600" algn="l" defTabSz="457200" rtl="0" eaLnBrk="1" latinLnBrk="0" hangingPunct="1">
-              <a:spcBef>
-                <a:spcPts val="1000"/>
-              </a:spcBef>
-              <a:spcAft>
-                <a:spcPts val="0"/>
-              </a:spcAft>
-              <a:buClr>
-                <a:schemeClr val="accent1"/>
-              </a:buClr>
-              <a:buSzPct val="80000"/>
-              <a:buFont typeface="Wingdings 3" charset="2"/>
-              <a:buChar char=""/>
-              <a:defRPr sz="1200" b="0" i="0" kern="1200">
-                <a:solidFill>
-                  <a:schemeClr val="tx1">
-                    <a:lumMod val="75000"/>
-                    <a:lumOff val="25000"/>
-                  </a:schemeClr>
-                </a:solidFill>
-                <a:latin typeface="+mn-lt"/>
-                <a:ea typeface="+mn-ea"/>
-                <a:cs typeface="+mn-cs"/>
-              </a:defRPr>
-            </a:lvl8pPr>
-            <a:lvl9pPr marL="3886200" indent="-228600" algn="l" defTabSz="457200" rtl="0" eaLnBrk="1" latinLnBrk="0" hangingPunct="1">
-              <a:spcBef>
-                <a:spcPts val="1000"/>
-              </a:spcBef>
-              <a:spcAft>
-                <a:spcPts val="0"/>
-              </a:spcAft>
-              <a:buClr>
-                <a:schemeClr val="accent1"/>
-              </a:buClr>
-              <a:buSzPct val="80000"/>
-              <a:buFont typeface="Wingdings 3" charset="2"/>
-              <a:buChar char=""/>
-              <a:defRPr sz="1200" b="0" i="0" kern="1200">
-                <a:solidFill>
-                  <a:schemeClr val="tx1">
-                    <a:lumMod val="75000"/>
-                    <a:lumOff val="25000"/>
-                  </a:schemeClr>
-                </a:solidFill>
-                <a:latin typeface="+mn-lt"/>
-                <a:ea typeface="+mn-ea"/>
-                <a:cs typeface="+mn-cs"/>
-              </a:defRPr>
-            </a:lvl9pPr>
-          </a:lstStyle>
-          <a:p>
-            <a:r>
-              <a:rPr lang="es-CO" dirty="0" err="1"/>
-              <a:t>Docker</a:t>
-            </a:r>
-            <a:r>
-              <a:rPr lang="es-CO" dirty="0"/>
-              <a:t>, me permite meter en un contenedor (“una caja”, algo auto contenido, cerrado) todas aquellas cosas que mi aplicación necesita para ser ejecutada (java, </a:t>
-            </a:r>
-            <a:r>
-              <a:rPr lang="es-CO" dirty="0" err="1"/>
-              <a:t>Maven</a:t>
-            </a:r>
-            <a:r>
-              <a:rPr lang="es-CO" dirty="0"/>
-              <a:t>, </a:t>
-            </a:r>
-            <a:r>
-              <a:rPr lang="es-CO" dirty="0" err="1"/>
-              <a:t>tomcat</a:t>
-            </a:r>
-            <a:r>
-              <a:rPr lang="es-CO" dirty="0"/>
-              <a:t>…) y la propia aplicación. Así yo me puedo llevar ese contenedor a cualquier máquina que tenga instalado </a:t>
-            </a:r>
-            <a:r>
-              <a:rPr lang="es-CO" dirty="0" err="1"/>
-              <a:t>Docker</a:t>
-            </a:r>
-            <a:r>
-              <a:rPr lang="es-CO" dirty="0"/>
-              <a:t> y ejecutar la aplicación sin tener que hacer nada más, ni preocuparme de qué versiones de software tiene instalada esa máquina, de si tiene los elementos necesarios para que </a:t>
-            </a:r>
-            <a:r>
-              <a:rPr lang="es-CO" dirty="0" smtClean="0"/>
-              <a:t>funcione mi aplicación.</a:t>
-            </a:r>
-          </a:p>
-          <a:p>
-            <a:endParaRPr lang="es-CO" dirty="0" smtClean="0"/>
-          </a:p>
-          <a:p>
-            <a:endParaRPr lang="es-CO" dirty="0" smtClean="0"/>
-          </a:p>
-          <a:p>
-            <a:endParaRPr lang="es-CO" dirty="0" smtClean="0"/>
-          </a:p>
-          <a:p>
-            <a:endParaRPr lang="es-CO" dirty="0"/>
-          </a:p>
-        </p:txBody>
-      </p:sp>
-      <p:pic>
-        <p:nvPicPr>
-          <p:cNvPr id="4" name="Imagen 3"/>
-          <p:cNvPicPr>
-            <a:picLocks noChangeAspect="1"/>
-          </p:cNvPicPr>
-          <p:nvPr/>
-        </p:nvPicPr>
-        <p:blipFill>
-          <a:blip r:embed="rId3"/>
-          <a:stretch>
-            <a:fillRect/>
-          </a:stretch>
-        </p:blipFill>
-        <p:spPr>
-          <a:xfrm>
-            <a:off x="9725324" y="4989357"/>
-            <a:ext cx="1133608" cy="638712"/>
-          </a:xfrm>
-          <a:prstGeom prst="rect">
-            <a:avLst/>
-          </a:prstGeom>
-        </p:spPr>
-      </p:pic>
-    </p:spTree>
-    <p:extLst>
-      <p:ext uri="{BB962C8B-B14F-4D97-AF65-F5344CB8AC3E}">
-        <p14:creationId xmlns:p14="http://schemas.microsoft.com/office/powerpoint/2010/main" val="2651567508"/>
-      </p:ext>
-    </p:extLst>
-  </p:cSld>
-  <p:clrMapOvr>
-    <a:masterClrMapping/>
-  </p:clrMapOvr>
-</p:sld>
-</file>
-
 <file path=ppt/theme/theme1.xml><?xml version="1.0" encoding="utf-8"?>
 <a:theme xmlns:a="http://schemas.openxmlformats.org/drawingml/2006/main" name="Sala de reuniones Ion">
   <a:themeElements>

</xml_diff>